<commit_message>
day 3 slide changes
</commit_message>
<xml_diff>
--- a/Day 3 - Introduction to CSS - Cascading Style Sheets.pptx
+++ b/Day 3 - Introduction to CSS - Cascading Style Sheets.pptx
@@ -23,8 +23,9 @@
     <p:sldId id="271" r:id="rId17"/>
     <p:sldId id="272" r:id="rId18"/>
     <p:sldId id="273" r:id="rId19"/>
-    <p:sldId id="274" r:id="rId20"/>
-    <p:sldId id="275" r:id="rId21"/>
+    <p:sldId id="276" r:id="rId20"/>
+    <p:sldId id="274" r:id="rId21"/>
+    <p:sldId id="275" r:id="rId22"/>
   </p:sldIdLst>
   <p:sldSz cx="12192000" cy="6858000"/>
   <p:notesSz cx="6858000" cy="9144000"/>
@@ -123,6 +124,11 @@
       </a:defRPr>
     </a:lvl9pPr>
   </p:defaultTextStyle>
+  <p:extLst>
+    <p:ext uri="{EFAFB233-063F-42B5-8137-9DF3F51BA10A}">
+      <p15:sldGuideLst xmlns:p15="http://schemas.microsoft.com/office/powerpoint/2012/main"/>
+    </p:ext>
+  </p:extLst>
 </p:presentation>
 </file>
 
@@ -309,7 +315,7 @@
           <a:p>
             <a:fld id="{4AAD347D-5ACD-4C99-B74B-A9C85AD731AF}" type="datetimeFigureOut">
               <a:rPr lang="en-US" dirty="0"/>
-              <a:t>6/26/2018</a:t>
+              <a:t>6/27/2018</a:t>
             </a:fld>
             <a:endParaRPr lang="en-US" dirty="0"/>
           </a:p>
@@ -579,7 +585,7 @@
           <a:p>
             <a:fld id="{4509A250-FF31-4206-8172-F9D3106AACB1}" type="datetimeFigureOut">
               <a:rPr lang="en-US" dirty="0"/>
-              <a:t>6/26/2018</a:t>
+              <a:t>6/27/2018</a:t>
             </a:fld>
             <a:endParaRPr lang="en-US" dirty="0"/>
           </a:p>
@@ -768,7 +774,7 @@
           <a:p>
             <a:fld id="{4509A250-FF31-4206-8172-F9D3106AACB1}" type="datetimeFigureOut">
               <a:rPr lang="en-US" dirty="0"/>
-              <a:t>6/26/2018</a:t>
+              <a:t>6/27/2018</a:t>
             </a:fld>
             <a:endParaRPr lang="en-US" dirty="0"/>
           </a:p>
@@ -1031,7 +1037,7 @@
           <a:p>
             <a:fld id="{4509A250-FF31-4206-8172-F9D3106AACB1}" type="datetimeFigureOut">
               <a:rPr lang="en-US" dirty="0"/>
-              <a:t>6/26/2018</a:t>
+              <a:t>6/27/2018</a:t>
             </a:fld>
             <a:endParaRPr lang="en-US" dirty="0"/>
           </a:p>
@@ -1358,7 +1364,7 @@
           <a:p>
             <a:fld id="{4509A250-FF31-4206-8172-F9D3106AACB1}" type="datetimeFigureOut">
               <a:rPr lang="en-US" dirty="0"/>
-              <a:t>6/26/2018</a:t>
+              <a:t>6/27/2018</a:t>
             </a:fld>
             <a:endParaRPr lang="en-US" dirty="0"/>
           </a:p>
@@ -1963,7 +1969,7 @@
           <a:p>
             <a:fld id="{4509A250-FF31-4206-8172-F9D3106AACB1}" type="datetimeFigureOut">
               <a:rPr lang="en-US" dirty="0"/>
-              <a:t>6/26/2018</a:t>
+              <a:t>6/27/2018</a:t>
             </a:fld>
             <a:endParaRPr lang="en-US" dirty="0"/>
           </a:p>
@@ -2805,7 +2811,7 @@
           <a:p>
             <a:fld id="{4509A250-FF31-4206-8172-F9D3106AACB1}" type="datetimeFigureOut">
               <a:rPr lang="en-US" dirty="0"/>
-              <a:t>6/26/2018</a:t>
+              <a:t>6/27/2018</a:t>
             </a:fld>
             <a:endParaRPr lang="en-US" dirty="0"/>
           </a:p>
@@ -2970,7 +2976,7 @@
           <a:p>
             <a:fld id="{4509A250-FF31-4206-8172-F9D3106AACB1}" type="datetimeFigureOut">
               <a:rPr lang="en-US" dirty="0"/>
-              <a:t>6/26/2018</a:t>
+              <a:t>6/27/2018</a:t>
             </a:fld>
             <a:endParaRPr lang="en-US" dirty="0"/>
           </a:p>
@@ -3145,7 +3151,7 @@
           <a:p>
             <a:fld id="{4509A250-FF31-4206-8172-F9D3106AACB1}" type="datetimeFigureOut">
               <a:rPr lang="en-US" dirty="0"/>
-              <a:t>6/26/2018</a:t>
+              <a:t>6/27/2018</a:t>
             </a:fld>
             <a:endParaRPr lang="en-US" dirty="0"/>
           </a:p>
@@ -3310,7 +3316,7 @@
           <a:p>
             <a:fld id="{4509A250-FF31-4206-8172-F9D3106AACB1}" type="datetimeFigureOut">
               <a:rPr lang="en-US" dirty="0"/>
-              <a:t>6/26/2018</a:t>
+              <a:t>6/27/2018</a:t>
             </a:fld>
             <a:endParaRPr lang="en-US" dirty="0"/>
           </a:p>
@@ -3549,7 +3555,7 @@
           <a:p>
             <a:fld id="{9796027F-7875-4030-9381-8BD8C4F21935}" type="datetimeFigureOut">
               <a:rPr lang="en-US" dirty="0"/>
-              <a:t>6/26/2018</a:t>
+              <a:t>6/27/2018</a:t>
             </a:fld>
             <a:endParaRPr lang="en-US" dirty="0"/>
           </a:p>
@@ -3836,7 +3842,7 @@
           <a:p>
             <a:fld id="{9796027F-7875-4030-9381-8BD8C4F21935}" type="datetimeFigureOut">
               <a:rPr lang="en-US" dirty="0"/>
-              <a:t>6/26/2018</a:t>
+              <a:t>6/27/2018</a:t>
             </a:fld>
             <a:endParaRPr lang="en-US" dirty="0"/>
           </a:p>
@@ -4269,7 +4275,7 @@
           <a:p>
             <a:fld id="{9796027F-7875-4030-9381-8BD8C4F21935}" type="datetimeFigureOut">
               <a:rPr lang="en-US" dirty="0"/>
-              <a:t>6/26/2018</a:t>
+              <a:t>6/27/2018</a:t>
             </a:fld>
             <a:endParaRPr lang="en-US" dirty="0"/>
           </a:p>
@@ -4382,7 +4388,7 @@
           <a:p>
             <a:fld id="{4509A250-FF31-4206-8172-F9D3106AACB1}" type="datetimeFigureOut">
               <a:rPr lang="en-US" dirty="0"/>
-              <a:t>6/26/2018</a:t>
+              <a:t>6/27/2018</a:t>
             </a:fld>
             <a:endParaRPr lang="en-US" dirty="0"/>
           </a:p>
@@ -4472,7 +4478,7 @@
           <a:p>
             <a:fld id="{4509A250-FF31-4206-8172-F9D3106AACB1}" type="datetimeFigureOut">
               <a:rPr lang="en-US" dirty="0"/>
-              <a:t>6/26/2018</a:t>
+              <a:t>6/27/2018</a:t>
             </a:fld>
             <a:endParaRPr lang="en-US" dirty="0"/>
           </a:p>
@@ -4746,7 +4752,7 @@
           <a:p>
             <a:fld id="{4509A250-FF31-4206-8172-F9D3106AACB1}" type="datetimeFigureOut">
               <a:rPr lang="en-US" dirty="0"/>
-              <a:t>6/26/2018</a:t>
+              <a:t>6/27/2018</a:t>
             </a:fld>
             <a:endParaRPr lang="en-US" dirty="0"/>
           </a:p>
@@ -5016,7 +5022,7 @@
           <a:p>
             <a:fld id="{4509A250-FF31-4206-8172-F9D3106AACB1}" type="datetimeFigureOut">
               <a:rPr lang="en-US" dirty="0"/>
-              <a:t>6/26/2018</a:t>
+              <a:t>6/27/2018</a:t>
             </a:fld>
             <a:endParaRPr lang="en-US" dirty="0"/>
           </a:p>
@@ -5440,7 +5446,7 @@
           <a:p>
             <a:fld id="{4AAD347D-5ACD-4C99-B74B-A9C85AD731AF}" type="datetimeFigureOut">
               <a:rPr lang="en-US" dirty="0"/>
-              <a:t>6/26/2018</a:t>
+              <a:t>6/27/2018</a:t>
             </a:fld>
             <a:endParaRPr lang="en-US" dirty="0"/>
           </a:p>
@@ -6070,6 +6076,13 @@
   <p:clrMapOvr>
     <a:masterClrMapping/>
   </p:clrMapOvr>
+  <p:timing>
+    <p:tnLst>
+      <p:par>
+        <p:cTn id="1" dur="indefinite" restart="never" nodeType="tmRoot"/>
+      </p:par>
+    </p:tnLst>
+  </p:timing>
 </p:sld>
 </file>
 
@@ -6224,6 +6237,13 @@
   <p:clrMapOvr>
     <a:masterClrMapping/>
   </p:clrMapOvr>
+  <p:timing>
+    <p:tnLst>
+      <p:par>
+        <p:cTn id="1" dur="indefinite" restart="never" nodeType="tmRoot"/>
+      </p:par>
+    </p:tnLst>
+  </p:timing>
 </p:sld>
 </file>
 
@@ -6473,6 +6493,13 @@
   <p:clrMapOvr>
     <a:masterClrMapping/>
   </p:clrMapOvr>
+  <p:timing>
+    <p:tnLst>
+      <p:par>
+        <p:cTn id="1" dur="indefinite" restart="never" nodeType="tmRoot"/>
+      </p:par>
+    </p:tnLst>
+  </p:timing>
 </p:sld>
 </file>
 
@@ -6670,6 +6697,13 @@
   <p:clrMapOvr>
     <a:masterClrMapping/>
   </p:clrMapOvr>
+  <p:timing>
+    <p:tnLst>
+      <p:par>
+        <p:cTn id="1" dur="indefinite" restart="never" nodeType="tmRoot"/>
+      </p:par>
+    </p:tnLst>
+  </p:timing>
 </p:sld>
 </file>
 
@@ -6814,6 +6848,13 @@
   <p:clrMapOvr>
     <a:masterClrMapping/>
   </p:clrMapOvr>
+  <p:timing>
+    <p:tnLst>
+      <p:par>
+        <p:cTn id="1" dur="indefinite" restart="never" nodeType="tmRoot"/>
+      </p:par>
+    </p:tnLst>
+  </p:timing>
 </p:sld>
 </file>
 
@@ -7088,6 +7129,13 @@
   <p:clrMapOvr>
     <a:masterClrMapping/>
   </p:clrMapOvr>
+  <p:timing>
+    <p:tnLst>
+      <p:par>
+        <p:cTn id="1" dur="indefinite" restart="never" nodeType="tmRoot"/>
+      </p:par>
+    </p:tnLst>
+  </p:timing>
 </p:sld>
 </file>
 
@@ -7355,6 +7403,13 @@
   <p:clrMapOvr>
     <a:masterClrMapping/>
   </p:clrMapOvr>
+  <p:timing>
+    <p:tnLst>
+      <p:par>
+        <p:cTn id="1" dur="indefinite" restart="never" nodeType="tmRoot"/>
+      </p:par>
+    </p:tnLst>
+  </p:timing>
 </p:sld>
 </file>
 
@@ -7546,6 +7601,13 @@
   <p:clrMapOvr>
     <a:masterClrMapping/>
   </p:clrMapOvr>
+  <p:timing>
+    <p:tnLst>
+      <p:par>
+        <p:cTn id="1" dur="indefinite" restart="never" nodeType="tmRoot"/>
+      </p:par>
+    </p:tnLst>
+  </p:timing>
 </p:sld>
 </file>
 
@@ -7676,6 +7738,13 @@
   <p:clrMapOvr>
     <a:masterClrMapping/>
   </p:clrMapOvr>
+  <p:timing>
+    <p:tnLst>
+      <p:par>
+        <p:cTn id="1" dur="indefinite" restart="never" nodeType="tmRoot"/>
+      </p:par>
+    </p:tnLst>
+  </p:timing>
 </p:sld>
 </file>
 
@@ -7719,8 +7788,21 @@
           <a:p>
             <a:r>
               <a:rPr lang="en-US" dirty="0"/>
-              <a:t>Assignment 2 due – 6/27/2018</a:t>
-            </a:r>
+              <a:t>Assignment </a:t>
+            </a:r>
+            <a:r>
+              <a:rPr lang="en-US" dirty="0" smtClean="0"/>
+              <a:t>3 </a:t>
+            </a:r>
+            <a:r>
+              <a:rPr lang="en-US" dirty="0"/>
+              <a:t>due – </a:t>
+            </a:r>
+            <a:r>
+              <a:rPr lang="en-US" dirty="0" smtClean="0"/>
+              <a:t>6/28/2018</a:t>
+            </a:r>
+            <a:endParaRPr lang="en-US" dirty="0"/>
           </a:p>
         </p:txBody>
       </p:sp>
@@ -7742,12 +7824,203 @@
         </p:nvSpPr>
         <p:spPr/>
         <p:txBody>
+          <a:bodyPr>
+            <a:normAutofit/>
+          </a:bodyPr>
+          <a:lstStyle/>
+          <a:p>
+            <a:r>
+              <a:rPr lang="en-US" dirty="0"/>
+              <a:t>Create a sample html </a:t>
+            </a:r>
+            <a:r>
+              <a:rPr lang="en-US" dirty="0" smtClean="0"/>
+              <a:t>file.</a:t>
+            </a:r>
+          </a:p>
+          <a:p>
+            <a:endParaRPr lang="en-US" dirty="0"/>
+          </a:p>
+          <a:p>
+            <a:r>
+              <a:rPr lang="en-US" dirty="0" smtClean="0"/>
+              <a:t>Go to the next 3 slides for the questions.</a:t>
+            </a:r>
+          </a:p>
+          <a:p>
+            <a:endParaRPr lang="en-US" dirty="0"/>
+          </a:p>
+          <a:p>
+            <a:r>
+              <a:rPr lang="en-US" dirty="0"/>
+              <a:t>Save this as “</a:t>
+            </a:r>
+            <a:r>
+              <a:rPr lang="en-US" b="1" dirty="0" smtClean="0"/>
+              <a:t>assignment3.html</a:t>
+            </a:r>
+            <a:r>
+              <a:rPr lang="en-US" dirty="0"/>
+              <a:t>” </a:t>
+            </a:r>
+            <a:r>
+              <a:rPr lang="en-US" dirty="0" smtClean="0"/>
+              <a:t>in </a:t>
+            </a:r>
+            <a:r>
+              <a:rPr lang="en-US" dirty="0"/>
+              <a:t>your repository “</a:t>
+            </a:r>
+            <a:r>
+              <a:rPr lang="en-US" b="1" dirty="0" err="1"/>
+              <a:t>Assignments_yourname</a:t>
+            </a:r>
+            <a:r>
+              <a:rPr lang="en-US" dirty="0" smtClean="0"/>
+              <a:t>”.</a:t>
+            </a:r>
+          </a:p>
+          <a:p>
+            <a:endParaRPr lang="en-US" dirty="0"/>
+          </a:p>
+          <a:p>
+            <a:r>
+              <a:rPr lang="en-US" b="1" dirty="0"/>
+              <a:t>Commit</a:t>
+            </a:r>
+            <a:r>
+              <a:rPr lang="en-US" dirty="0"/>
+              <a:t> and </a:t>
+            </a:r>
+            <a:r>
+              <a:rPr lang="en-US" b="1" dirty="0"/>
+              <a:t>push</a:t>
+            </a:r>
+            <a:r>
+              <a:rPr lang="en-US" dirty="0"/>
+              <a:t> the changes to the repository.</a:t>
+            </a:r>
+            <a:endParaRPr lang="en-US" dirty="0"/>
+          </a:p>
+        </p:txBody>
+      </p:sp>
+    </p:spTree>
+    <p:extLst>
+      <p:ext uri="{BB962C8B-B14F-4D97-AF65-F5344CB8AC3E}">
+        <p14:creationId xmlns:p14="http://schemas.microsoft.com/office/powerpoint/2010/main" val="388981528"/>
+      </p:ext>
+    </p:extLst>
+  </p:cSld>
+  <p:clrMapOvr>
+    <a:masterClrMapping/>
+  </p:clrMapOvr>
+  <p:timing>
+    <p:tnLst>
+      <p:par>
+        <p:cTn id="1" dur="indefinite" restart="never" nodeType="tmRoot"/>
+      </p:par>
+    </p:tnLst>
+  </p:timing>
+</p:sld>
+</file>
+
+<file path=ppt/slides/slide19.xml><?xml version="1.0" encoding="utf-8"?>
+<p:sld xmlns:a="http://schemas.openxmlformats.org/drawingml/2006/main" xmlns:r="http://schemas.openxmlformats.org/officeDocument/2006/relationships" xmlns:p="http://schemas.openxmlformats.org/presentationml/2006/main">
+  <p:cSld>
+    <p:spTree>
+      <p:nvGrpSpPr>
+        <p:cNvPr id="1" name=""/>
+        <p:cNvGrpSpPr/>
+        <p:nvPr/>
+      </p:nvGrpSpPr>
+      <p:grpSpPr>
+        <a:xfrm>
+          <a:off x="0" y="0"/>
+          <a:ext cx="0" cy="0"/>
+          <a:chOff x="0" y="0"/>
+          <a:chExt cx="0" cy="0"/>
+        </a:xfrm>
+      </p:grpSpPr>
+      <p:sp>
+        <p:nvSpPr>
+          <p:cNvPr id="2" name="Title 1">
+            <a:extLst>
+              <a:ext uri="{FF2B5EF4-FFF2-40B4-BE49-F238E27FC236}">
+                <a16:creationId xmlns:a16="http://schemas.microsoft.com/office/drawing/2014/main" id="{17680628-8612-4072-8BF6-B837123BDC03}"/>
+              </a:ext>
+            </a:extLst>
+          </p:cNvPr>
+          <p:cNvSpPr>
+            <a:spLocks noGrp="1"/>
+          </p:cNvSpPr>
+          <p:nvPr>
+            <p:ph type="title"/>
+          </p:nvPr>
+        </p:nvSpPr>
+        <p:spPr/>
+        <p:txBody>
           <a:bodyPr/>
           <a:lstStyle/>
           <a:p>
             <a:r>
               <a:rPr lang="en-US" dirty="0"/>
-              <a:t>Change the color of all </a:t>
+              <a:t>Assignment </a:t>
+            </a:r>
+            <a:r>
+              <a:rPr lang="en-US" dirty="0" smtClean="0"/>
+              <a:t>3 </a:t>
+            </a:r>
+            <a:r>
+              <a:rPr lang="en-US" dirty="0"/>
+              <a:t>due – </a:t>
+            </a:r>
+            <a:r>
+              <a:rPr lang="en-US" dirty="0" smtClean="0"/>
+              <a:t>6/28/2018</a:t>
+            </a:r>
+            <a:endParaRPr lang="en-US" dirty="0"/>
+          </a:p>
+        </p:txBody>
+      </p:sp>
+      <p:sp>
+        <p:nvSpPr>
+          <p:cNvPr id="3" name="Content Placeholder 2">
+            <a:extLst>
+              <a:ext uri="{FF2B5EF4-FFF2-40B4-BE49-F238E27FC236}">
+                <a16:creationId xmlns:a16="http://schemas.microsoft.com/office/drawing/2014/main" id="{BF5B3DCD-3B16-4CDD-A341-EBE9C294CBE7}"/>
+              </a:ext>
+            </a:extLst>
+          </p:cNvPr>
+          <p:cNvSpPr>
+            <a:spLocks noGrp="1"/>
+          </p:cNvSpPr>
+          <p:nvPr>
+            <p:ph idx="1"/>
+          </p:nvPr>
+        </p:nvSpPr>
+        <p:spPr/>
+        <p:txBody>
+          <a:bodyPr/>
+          <a:lstStyle/>
+          <a:p>
+            <a:pPr marL="0" indent="0">
+              <a:buNone/>
+            </a:pPr>
+            <a:r>
+              <a:rPr lang="en-US" dirty="0" smtClean="0">
+                <a:solidFill>
+                  <a:srgbClr val="FFC000"/>
+                </a:solidFill>
+              </a:rPr>
+              <a:t>a.</a:t>
+            </a:r>
+            <a:r>
+              <a:rPr lang="en-US" dirty="0" smtClean="0"/>
+              <a:t> Change </a:t>
+            </a:r>
+            <a:r>
+              <a:rPr lang="en-US" dirty="0"/>
+              <a:t>the color of all </a:t>
             </a:r>
             <a:r>
               <a:rPr lang="en-US" dirty="0">
@@ -7805,17 +8078,24 @@
     </p:spTree>
     <p:extLst>
       <p:ext uri="{BB962C8B-B14F-4D97-AF65-F5344CB8AC3E}">
-        <p14:creationId xmlns:p14="http://schemas.microsoft.com/office/powerpoint/2010/main" val="388981528"/>
+        <p14:creationId xmlns:p14="http://schemas.microsoft.com/office/powerpoint/2010/main" val="1713778871"/>
       </p:ext>
     </p:extLst>
   </p:cSld>
   <p:clrMapOvr>
     <a:masterClrMapping/>
   </p:clrMapOvr>
+  <p:timing>
+    <p:tnLst>
+      <p:par>
+        <p:cTn id="1" dur="indefinite" restart="never" nodeType="tmRoot"/>
+      </p:par>
+    </p:tnLst>
+  </p:timing>
 </p:sld>
 </file>
 
-<file path=ppt/slides/slide19.xml><?xml version="1.0" encoding="utf-8"?>
+<file path=ppt/slides/slide2.xml><?xml version="1.0" encoding="utf-8"?>
 <p:sld xmlns:a="http://schemas.openxmlformats.org/drawingml/2006/main" xmlns:r="http://schemas.openxmlformats.org/officeDocument/2006/relationships" xmlns:p="http://schemas.openxmlformats.org/presentationml/2006/main">
   <p:cSld>
     <p:spTree>
@@ -7837,6 +8117,214 @@
           <p:cNvPr id="2" name="Title 1">
             <a:extLst>
               <a:ext uri="{FF2B5EF4-FFF2-40B4-BE49-F238E27FC236}">
+                <a16:creationId xmlns:a16="http://schemas.microsoft.com/office/drawing/2014/main" id="{D644A4CE-868B-4160-815A-C9C48EF0CC23}"/>
+              </a:ext>
+            </a:extLst>
+          </p:cNvPr>
+          <p:cNvSpPr>
+            <a:spLocks noGrp="1"/>
+          </p:cNvSpPr>
+          <p:nvPr>
+            <p:ph type="title"/>
+          </p:nvPr>
+        </p:nvSpPr>
+        <p:spPr/>
+        <p:txBody>
+          <a:bodyPr/>
+          <a:lstStyle/>
+          <a:p>
+            <a:r>
+              <a:rPr lang="en-US" dirty="0"/>
+              <a:t>CSS introduction</a:t>
+            </a:r>
+          </a:p>
+        </p:txBody>
+      </p:sp>
+      <p:sp>
+        <p:nvSpPr>
+          <p:cNvPr id="3" name="Content Placeholder 2">
+            <a:extLst>
+              <a:ext uri="{FF2B5EF4-FFF2-40B4-BE49-F238E27FC236}">
+                <a16:creationId xmlns:a16="http://schemas.microsoft.com/office/drawing/2014/main" id="{BA9339C4-877D-4C81-B422-C54222B6436C}"/>
+              </a:ext>
+            </a:extLst>
+          </p:cNvPr>
+          <p:cNvSpPr>
+            <a:spLocks noGrp="1"/>
+          </p:cNvSpPr>
+          <p:nvPr>
+            <p:ph idx="1"/>
+          </p:nvPr>
+        </p:nvSpPr>
+        <p:spPr>
+          <a:xfrm>
+            <a:off x="1103313" y="1543522"/>
+            <a:ext cx="6327166" cy="4863903"/>
+          </a:xfrm>
+        </p:spPr>
+        <p:txBody>
+          <a:bodyPr/>
+          <a:lstStyle/>
+          <a:p>
+            <a:r>
+              <a:rPr lang="en-US" b="1" dirty="0"/>
+              <a:t>CSS</a:t>
+            </a:r>
+            <a:r>
+              <a:rPr lang="en-US" dirty="0"/>
+              <a:t> stands for </a:t>
+            </a:r>
+            <a:r>
+              <a:rPr lang="en-US" b="1" dirty="0"/>
+              <a:t>C</a:t>
+            </a:r>
+            <a:r>
+              <a:rPr lang="en-US" dirty="0"/>
+              <a:t>ascading </a:t>
+            </a:r>
+            <a:r>
+              <a:rPr lang="en-US" b="1" dirty="0"/>
+              <a:t>S</a:t>
+            </a:r>
+            <a:r>
+              <a:rPr lang="en-US" dirty="0"/>
+              <a:t>tyle </a:t>
+            </a:r>
+            <a:r>
+              <a:rPr lang="en-US" b="1" dirty="0"/>
+              <a:t>S</a:t>
+            </a:r>
+            <a:r>
+              <a:rPr lang="en-US" dirty="0"/>
+              <a:t>heets</a:t>
+            </a:r>
+          </a:p>
+          <a:p>
+            <a:endParaRPr lang="en-US" dirty="0"/>
+          </a:p>
+          <a:p>
+            <a:r>
+              <a:rPr lang="en-US" dirty="0"/>
+              <a:t>CSS is a language that describes the style of an HTML document.</a:t>
+            </a:r>
+          </a:p>
+          <a:p>
+            <a:endParaRPr lang="en-US" dirty="0"/>
+          </a:p>
+          <a:p>
+            <a:r>
+              <a:rPr lang="en-US" dirty="0"/>
+              <a:t>CSS describes how HTML elements should be displayed.</a:t>
+            </a:r>
+          </a:p>
+          <a:p>
+            <a:endParaRPr lang="en-US" dirty="0"/>
+          </a:p>
+          <a:p>
+            <a:r>
+              <a:rPr lang="en-US" dirty="0"/>
+              <a:t>CSS </a:t>
+            </a:r>
+            <a:r>
+              <a:rPr lang="en-US" b="1" dirty="0"/>
+              <a:t>saves a lot of work</a:t>
+            </a:r>
+            <a:r>
+              <a:rPr lang="en-US" dirty="0"/>
+              <a:t>. It can control the layout of multiple web pages all at once.</a:t>
+            </a:r>
+          </a:p>
+          <a:p>
+            <a:endParaRPr lang="en-US" dirty="0"/>
+          </a:p>
+          <a:p>
+            <a:r>
+              <a:rPr lang="en-US" dirty="0"/>
+              <a:t>External stylesheets are stored in </a:t>
+            </a:r>
+            <a:r>
+              <a:rPr lang="en-US" b="1" dirty="0"/>
+              <a:t>CSS files.</a:t>
+            </a:r>
+            <a:endParaRPr lang="en-US" dirty="0"/>
+          </a:p>
+          <a:p>
+            <a:endParaRPr lang="en-US" dirty="0"/>
+          </a:p>
+        </p:txBody>
+      </p:sp>
+      <p:pic>
+        <p:nvPicPr>
+          <p:cNvPr id="4" name="Picture 3">
+            <a:extLst>
+              <a:ext uri="{FF2B5EF4-FFF2-40B4-BE49-F238E27FC236}">
+                <a16:creationId xmlns:a16="http://schemas.microsoft.com/office/drawing/2014/main" id="{96FBFE70-EDBA-4563-9A53-351AF589A19B}"/>
+              </a:ext>
+            </a:extLst>
+          </p:cNvPr>
+          <p:cNvPicPr>
+            <a:picLocks noChangeAspect="1"/>
+          </p:cNvPicPr>
+          <p:nvPr/>
+        </p:nvPicPr>
+        <p:blipFill>
+          <a:blip r:embed="rId2"/>
+          <a:stretch>
+            <a:fillRect/>
+          </a:stretch>
+        </p:blipFill>
+        <p:spPr>
+          <a:xfrm>
+            <a:off x="7430479" y="1543522"/>
+            <a:ext cx="4328716" cy="4863903"/>
+          </a:xfrm>
+          <a:prstGeom prst="rect">
+            <a:avLst/>
+          </a:prstGeom>
+        </p:spPr>
+      </p:pic>
+    </p:spTree>
+    <p:extLst>
+      <p:ext uri="{BB962C8B-B14F-4D97-AF65-F5344CB8AC3E}">
+        <p14:creationId xmlns:p14="http://schemas.microsoft.com/office/powerpoint/2010/main" val="1105526066"/>
+      </p:ext>
+    </p:extLst>
+  </p:cSld>
+  <p:clrMapOvr>
+    <a:masterClrMapping/>
+  </p:clrMapOvr>
+  <p:timing>
+    <p:tnLst>
+      <p:par>
+        <p:cTn id="1" dur="indefinite" restart="never" nodeType="tmRoot"/>
+      </p:par>
+    </p:tnLst>
+  </p:timing>
+</p:sld>
+</file>
+
+<file path=ppt/slides/slide20.xml><?xml version="1.0" encoding="utf-8"?>
+<p:sld xmlns:a="http://schemas.openxmlformats.org/drawingml/2006/main" xmlns:r="http://schemas.openxmlformats.org/officeDocument/2006/relationships" xmlns:p="http://schemas.openxmlformats.org/presentationml/2006/main">
+  <p:cSld>
+    <p:spTree>
+      <p:nvGrpSpPr>
+        <p:cNvPr id="1" name=""/>
+        <p:cNvGrpSpPr/>
+        <p:nvPr/>
+      </p:nvGrpSpPr>
+      <p:grpSpPr>
+        <a:xfrm>
+          <a:off x="0" y="0"/>
+          <a:ext cx="0" cy="0"/>
+          <a:chOff x="0" y="0"/>
+          <a:chExt cx="0" cy="0"/>
+        </a:xfrm>
+      </p:grpSpPr>
+      <p:sp>
+        <p:nvSpPr>
+          <p:cNvPr id="2" name="Title 1">
+            <a:extLst>
+              <a:ext uri="{FF2B5EF4-FFF2-40B4-BE49-F238E27FC236}">
                 <a16:creationId xmlns:a16="http://schemas.microsoft.com/office/drawing/2014/main" id="{17680628-8612-4072-8BF6-B837123BDC03}"/>
               </a:ext>
             </a:extLst>
@@ -7855,8 +8343,21 @@
           <a:p>
             <a:r>
               <a:rPr lang="en-US" dirty="0"/>
-              <a:t>Assignment 2 due – 6/27/2018</a:t>
-            </a:r>
+              <a:t>Assignment </a:t>
+            </a:r>
+            <a:r>
+              <a:rPr lang="en-US" dirty="0" smtClean="0"/>
+              <a:t>3 </a:t>
+            </a:r>
+            <a:r>
+              <a:rPr lang="en-US" dirty="0"/>
+              <a:t>due – </a:t>
+            </a:r>
+            <a:r>
+              <a:rPr lang="en-US" dirty="0" smtClean="0"/>
+              <a:t>6/28/2018</a:t>
+            </a:r>
+            <a:endParaRPr lang="en-US" dirty="0"/>
           </a:p>
         </p:txBody>
       </p:sp>
@@ -7881,9 +8382,24 @@
           <a:bodyPr/>
           <a:lstStyle/>
           <a:p>
+            <a:pPr marL="0" indent="0">
+              <a:buNone/>
+            </a:pPr>
+            <a:r>
+              <a:rPr lang="da-DK" dirty="0" smtClean="0">
+                <a:solidFill>
+                  <a:srgbClr val="FFC000"/>
+                </a:solidFill>
+              </a:rPr>
+              <a:t>b. </a:t>
+            </a:r>
+            <a:r>
+              <a:rPr lang="da-DK" dirty="0" smtClean="0"/>
+              <a:t>Set </a:t>
+            </a:r>
             <a:r>
               <a:rPr lang="da-DK" dirty="0"/>
-              <a:t>Set a "4px", "dotted" border for </a:t>
+              <a:t>a "4px", "dotted" border for </a:t>
             </a:r>
             <a:r>
               <a:rPr lang="da-DK" dirty="0">
@@ -7941,10 +8457,17 @@
   <p:clrMapOvr>
     <a:masterClrMapping/>
   </p:clrMapOvr>
+  <p:timing>
+    <p:tnLst>
+      <p:par>
+        <p:cTn id="1" dur="indefinite" restart="never" nodeType="tmRoot"/>
+      </p:par>
+    </p:tnLst>
+  </p:timing>
 </p:sld>
 </file>
 
-<file path=ppt/slides/slide2.xml><?xml version="1.0" encoding="utf-8"?>
+<file path=ppt/slides/slide21.xml><?xml version="1.0" encoding="utf-8"?>
 <p:sld xmlns:a="http://schemas.openxmlformats.org/drawingml/2006/main" xmlns:r="http://schemas.openxmlformats.org/officeDocument/2006/relationships" xmlns:p="http://schemas.openxmlformats.org/presentationml/2006/main">
   <p:cSld>
     <p:spTree>
@@ -7966,207 +8489,6 @@
           <p:cNvPr id="2" name="Title 1">
             <a:extLst>
               <a:ext uri="{FF2B5EF4-FFF2-40B4-BE49-F238E27FC236}">
-                <a16:creationId xmlns:a16="http://schemas.microsoft.com/office/drawing/2014/main" id="{D644A4CE-868B-4160-815A-C9C48EF0CC23}"/>
-              </a:ext>
-            </a:extLst>
-          </p:cNvPr>
-          <p:cNvSpPr>
-            <a:spLocks noGrp="1"/>
-          </p:cNvSpPr>
-          <p:nvPr>
-            <p:ph type="title"/>
-          </p:nvPr>
-        </p:nvSpPr>
-        <p:spPr/>
-        <p:txBody>
-          <a:bodyPr/>
-          <a:lstStyle/>
-          <a:p>
-            <a:r>
-              <a:rPr lang="en-US" dirty="0"/>
-              <a:t>CSS introduction</a:t>
-            </a:r>
-          </a:p>
-        </p:txBody>
-      </p:sp>
-      <p:sp>
-        <p:nvSpPr>
-          <p:cNvPr id="3" name="Content Placeholder 2">
-            <a:extLst>
-              <a:ext uri="{FF2B5EF4-FFF2-40B4-BE49-F238E27FC236}">
-                <a16:creationId xmlns:a16="http://schemas.microsoft.com/office/drawing/2014/main" id="{BA9339C4-877D-4C81-B422-C54222B6436C}"/>
-              </a:ext>
-            </a:extLst>
-          </p:cNvPr>
-          <p:cNvSpPr>
-            <a:spLocks noGrp="1"/>
-          </p:cNvSpPr>
-          <p:nvPr>
-            <p:ph idx="1"/>
-          </p:nvPr>
-        </p:nvSpPr>
-        <p:spPr>
-          <a:xfrm>
-            <a:off x="1103313" y="1543522"/>
-            <a:ext cx="6327166" cy="4863903"/>
-          </a:xfrm>
-        </p:spPr>
-        <p:txBody>
-          <a:bodyPr/>
-          <a:lstStyle/>
-          <a:p>
-            <a:r>
-              <a:rPr lang="en-US" b="1" dirty="0"/>
-              <a:t>CSS</a:t>
-            </a:r>
-            <a:r>
-              <a:rPr lang="en-US" dirty="0"/>
-              <a:t> stands for </a:t>
-            </a:r>
-            <a:r>
-              <a:rPr lang="en-US" b="1" dirty="0"/>
-              <a:t>C</a:t>
-            </a:r>
-            <a:r>
-              <a:rPr lang="en-US" dirty="0"/>
-              <a:t>ascading </a:t>
-            </a:r>
-            <a:r>
-              <a:rPr lang="en-US" b="1" dirty="0"/>
-              <a:t>S</a:t>
-            </a:r>
-            <a:r>
-              <a:rPr lang="en-US" dirty="0"/>
-              <a:t>tyle </a:t>
-            </a:r>
-            <a:r>
-              <a:rPr lang="en-US" b="1" dirty="0"/>
-              <a:t>S</a:t>
-            </a:r>
-            <a:r>
-              <a:rPr lang="en-US" dirty="0"/>
-              <a:t>heets</a:t>
-            </a:r>
-          </a:p>
-          <a:p>
-            <a:endParaRPr lang="en-US" dirty="0"/>
-          </a:p>
-          <a:p>
-            <a:r>
-              <a:rPr lang="en-US" dirty="0"/>
-              <a:t>CSS is a language that describes the style of an HTML document.</a:t>
-            </a:r>
-          </a:p>
-          <a:p>
-            <a:endParaRPr lang="en-US" dirty="0"/>
-          </a:p>
-          <a:p>
-            <a:r>
-              <a:rPr lang="en-US" dirty="0"/>
-              <a:t>CSS describes how HTML elements should be displayed.</a:t>
-            </a:r>
-          </a:p>
-          <a:p>
-            <a:endParaRPr lang="en-US" dirty="0"/>
-          </a:p>
-          <a:p>
-            <a:r>
-              <a:rPr lang="en-US" dirty="0"/>
-              <a:t>CSS </a:t>
-            </a:r>
-            <a:r>
-              <a:rPr lang="en-US" b="1" dirty="0"/>
-              <a:t>saves a lot of work</a:t>
-            </a:r>
-            <a:r>
-              <a:rPr lang="en-US" dirty="0"/>
-              <a:t>. It can control the layout of multiple web pages all at once.</a:t>
-            </a:r>
-          </a:p>
-          <a:p>
-            <a:endParaRPr lang="en-US" dirty="0"/>
-          </a:p>
-          <a:p>
-            <a:r>
-              <a:rPr lang="en-US" dirty="0"/>
-              <a:t>External stylesheets are stored in </a:t>
-            </a:r>
-            <a:r>
-              <a:rPr lang="en-US" b="1" dirty="0"/>
-              <a:t>CSS files.</a:t>
-            </a:r>
-            <a:endParaRPr lang="en-US" dirty="0"/>
-          </a:p>
-          <a:p>
-            <a:endParaRPr lang="en-US" dirty="0"/>
-          </a:p>
-        </p:txBody>
-      </p:sp>
-      <p:pic>
-        <p:nvPicPr>
-          <p:cNvPr id="4" name="Picture 3">
-            <a:extLst>
-              <a:ext uri="{FF2B5EF4-FFF2-40B4-BE49-F238E27FC236}">
-                <a16:creationId xmlns:a16="http://schemas.microsoft.com/office/drawing/2014/main" id="{96FBFE70-EDBA-4563-9A53-351AF589A19B}"/>
-              </a:ext>
-            </a:extLst>
-          </p:cNvPr>
-          <p:cNvPicPr>
-            <a:picLocks noChangeAspect="1"/>
-          </p:cNvPicPr>
-          <p:nvPr/>
-        </p:nvPicPr>
-        <p:blipFill>
-          <a:blip r:embed="rId2"/>
-          <a:stretch>
-            <a:fillRect/>
-          </a:stretch>
-        </p:blipFill>
-        <p:spPr>
-          <a:xfrm>
-            <a:off x="7430479" y="1543522"/>
-            <a:ext cx="4328716" cy="4863903"/>
-          </a:xfrm>
-          <a:prstGeom prst="rect">
-            <a:avLst/>
-          </a:prstGeom>
-        </p:spPr>
-      </p:pic>
-    </p:spTree>
-    <p:extLst>
-      <p:ext uri="{BB962C8B-B14F-4D97-AF65-F5344CB8AC3E}">
-        <p14:creationId xmlns:p14="http://schemas.microsoft.com/office/powerpoint/2010/main" val="1105526066"/>
-      </p:ext>
-    </p:extLst>
-  </p:cSld>
-  <p:clrMapOvr>
-    <a:masterClrMapping/>
-  </p:clrMapOvr>
-</p:sld>
-</file>
-
-<file path=ppt/slides/slide20.xml><?xml version="1.0" encoding="utf-8"?>
-<p:sld xmlns:a="http://schemas.openxmlformats.org/drawingml/2006/main" xmlns:r="http://schemas.openxmlformats.org/officeDocument/2006/relationships" xmlns:p="http://schemas.openxmlformats.org/presentationml/2006/main">
-  <p:cSld>
-    <p:spTree>
-      <p:nvGrpSpPr>
-        <p:cNvPr id="1" name=""/>
-        <p:cNvGrpSpPr/>
-        <p:nvPr/>
-      </p:nvGrpSpPr>
-      <p:grpSpPr>
-        <a:xfrm>
-          <a:off x="0" y="0"/>
-          <a:ext cx="0" cy="0"/>
-          <a:chOff x="0" y="0"/>
-          <a:chExt cx="0" cy="0"/>
-        </a:xfrm>
-      </p:grpSpPr>
-      <p:sp>
-        <p:nvSpPr>
-          <p:cNvPr id="2" name="Title 1">
-            <a:extLst>
-              <a:ext uri="{FF2B5EF4-FFF2-40B4-BE49-F238E27FC236}">
                 <a16:creationId xmlns:a16="http://schemas.microsoft.com/office/drawing/2014/main" id="{17680628-8612-4072-8BF6-B837123BDC03}"/>
               </a:ext>
             </a:extLst>
@@ -8185,8 +8507,21 @@
           <a:p>
             <a:r>
               <a:rPr lang="en-US" dirty="0"/>
-              <a:t>Assignment 2 due – 6/27/2018</a:t>
-            </a:r>
+              <a:t>Assignment </a:t>
+            </a:r>
+            <a:r>
+              <a:rPr lang="en-US" dirty="0" smtClean="0"/>
+              <a:t>3 </a:t>
+            </a:r>
+            <a:r>
+              <a:rPr lang="en-US" dirty="0"/>
+              <a:t>due – </a:t>
+            </a:r>
+            <a:r>
+              <a:rPr lang="en-US" dirty="0" smtClean="0"/>
+              <a:t>6/28/2018</a:t>
+            </a:r>
+            <a:endParaRPr lang="en-US" dirty="0"/>
           </a:p>
         </p:txBody>
       </p:sp>
@@ -8211,9 +8546,24 @@
           <a:bodyPr/>
           <a:lstStyle/>
           <a:p>
-            <a:r>
-              <a:rPr lang="en-US" dirty="0"/>
-              <a:t>Set the top padding of </a:t>
+            <a:pPr marL="0" indent="0">
+              <a:buNone/>
+            </a:pPr>
+            <a:r>
+              <a:rPr lang="en-US" dirty="0" smtClean="0">
+                <a:solidFill>
+                  <a:srgbClr val="FFC000"/>
+                </a:solidFill>
+              </a:rPr>
+              <a:t>c. </a:t>
+            </a:r>
+            <a:r>
+              <a:rPr lang="en-US" dirty="0" smtClean="0"/>
+              <a:t>Set </a:t>
+            </a:r>
+            <a:r>
+              <a:rPr lang="en-US" dirty="0"/>
+              <a:t>the top padding of </a:t>
             </a:r>
             <a:r>
               <a:rPr lang="en-US" dirty="0">
@@ -8274,6 +8624,13 @@
   <p:clrMapOvr>
     <a:masterClrMapping/>
   </p:clrMapOvr>
+  <p:timing>
+    <p:tnLst>
+      <p:par>
+        <p:cTn id="1" dur="indefinite" restart="never" nodeType="tmRoot"/>
+      </p:par>
+    </p:tnLst>
+  </p:timing>
 </p:sld>
 </file>
 
@@ -8422,6 +8779,13 @@
   <p:clrMapOvr>
     <a:masterClrMapping/>
   </p:clrMapOvr>
+  <p:timing>
+    <p:tnLst>
+      <p:par>
+        <p:cTn id="1" dur="indefinite" restart="never" nodeType="tmRoot"/>
+      </p:par>
+    </p:tnLst>
+  </p:timing>
 </p:sld>
 </file>
 
@@ -9353,6 +9717,13 @@
   <p:clrMapOvr>
     <a:masterClrMapping/>
   </p:clrMapOvr>
+  <p:timing>
+    <p:tnLst>
+      <p:par>
+        <p:cTn id="1" dur="indefinite" restart="never" nodeType="tmRoot"/>
+      </p:par>
+    </p:tnLst>
+  </p:timing>
 </p:sld>
 </file>
 
@@ -9897,6 +10268,13 @@
   <p:clrMapOvr>
     <a:masterClrMapping/>
   </p:clrMapOvr>
+  <p:timing>
+    <p:tnLst>
+      <p:par>
+        <p:cTn id="1" dur="indefinite" restart="never" nodeType="tmRoot"/>
+      </p:par>
+    </p:tnLst>
+  </p:timing>
 </p:sld>
 </file>
 
@@ -10164,6 +10542,13 @@
   <p:clrMapOvr>
     <a:masterClrMapping/>
   </p:clrMapOvr>
+  <p:timing>
+    <p:tnLst>
+      <p:par>
+        <p:cTn id="1" dur="indefinite" restart="never" nodeType="tmRoot"/>
+      </p:par>
+    </p:tnLst>
+  </p:timing>
 </p:sld>
 </file>
 
@@ -10314,6 +10699,13 @@
   <p:clrMapOvr>
     <a:masterClrMapping/>
   </p:clrMapOvr>
+  <p:timing>
+    <p:tnLst>
+      <p:par>
+        <p:cTn id="1" dur="indefinite" restart="never" nodeType="tmRoot"/>
+      </p:par>
+    </p:tnLst>
+  </p:timing>
 </p:sld>
 </file>
 
@@ -10467,6 +10859,13 @@
   <p:clrMapOvr>
     <a:masterClrMapping/>
   </p:clrMapOvr>
+  <p:timing>
+    <p:tnLst>
+      <p:par>
+        <p:cTn id="1" dur="indefinite" restart="never" nodeType="tmRoot"/>
+      </p:par>
+    </p:tnLst>
+  </p:timing>
 </p:sld>
 </file>
 
@@ -10623,6 +11022,13 @@
   <p:clrMapOvr>
     <a:masterClrMapping/>
   </p:clrMapOvr>
+  <p:timing>
+    <p:tnLst>
+      <p:par>
+        <p:cTn id="1" dur="indefinite" restart="never" nodeType="tmRoot"/>
+      </p:par>
+    </p:tnLst>
+  </p:timing>
 </p:sld>
 </file>
 

</xml_diff>